<commit_message>
updated based on class
</commit_message>
<xml_diff>
--- a/machine_learning_trouble.pptx
+++ b/machine_learning_trouble.pptx
@@ -276,7 +276,7 @@
           <a:p>
             <a:fld id="{E8FEF256-CCEB-45F6-89AE-84593AFCBEA4}" type="datetimeFigureOut">
               <a:rPr lang="en-US" smtClean="0"/>
-              <a:t>7/15/2023</a:t>
+              <a:t>8/11/2023</a:t>
             </a:fld>
             <a:endParaRPr lang="en-US"/>
           </a:p>
@@ -446,7 +446,7 @@
           <a:p>
             <a:fld id="{E8FEF256-CCEB-45F6-89AE-84593AFCBEA4}" type="datetimeFigureOut">
               <a:rPr lang="en-US" smtClean="0"/>
-              <a:t>7/15/2023</a:t>
+              <a:t>8/11/2023</a:t>
             </a:fld>
             <a:endParaRPr lang="en-US"/>
           </a:p>
@@ -626,7 +626,7 @@
           <a:p>
             <a:fld id="{E8FEF256-CCEB-45F6-89AE-84593AFCBEA4}" type="datetimeFigureOut">
               <a:rPr lang="en-US" smtClean="0"/>
-              <a:t>7/15/2023</a:t>
+              <a:t>8/11/2023</a:t>
             </a:fld>
             <a:endParaRPr lang="en-US"/>
           </a:p>
@@ -796,7 +796,7 @@
           <a:p>
             <a:fld id="{E8FEF256-CCEB-45F6-89AE-84593AFCBEA4}" type="datetimeFigureOut">
               <a:rPr lang="en-US" smtClean="0"/>
-              <a:t>7/15/2023</a:t>
+              <a:t>8/11/2023</a:t>
             </a:fld>
             <a:endParaRPr lang="en-US"/>
           </a:p>
@@ -1042,7 +1042,7 @@
           <a:p>
             <a:fld id="{E8FEF256-CCEB-45F6-89AE-84593AFCBEA4}" type="datetimeFigureOut">
               <a:rPr lang="en-US" smtClean="0"/>
-              <a:t>7/15/2023</a:t>
+              <a:t>8/11/2023</a:t>
             </a:fld>
             <a:endParaRPr lang="en-US"/>
           </a:p>
@@ -1274,7 +1274,7 @@
           <a:p>
             <a:fld id="{E8FEF256-CCEB-45F6-89AE-84593AFCBEA4}" type="datetimeFigureOut">
               <a:rPr lang="en-US" smtClean="0"/>
-              <a:t>7/15/2023</a:t>
+              <a:t>8/11/2023</a:t>
             </a:fld>
             <a:endParaRPr lang="en-US"/>
           </a:p>
@@ -1641,7 +1641,7 @@
           <a:p>
             <a:fld id="{E8FEF256-CCEB-45F6-89AE-84593AFCBEA4}" type="datetimeFigureOut">
               <a:rPr lang="en-US" smtClean="0"/>
-              <a:t>7/15/2023</a:t>
+              <a:t>8/11/2023</a:t>
             </a:fld>
             <a:endParaRPr lang="en-US"/>
           </a:p>
@@ -1759,7 +1759,7 @@
           <a:p>
             <a:fld id="{E8FEF256-CCEB-45F6-89AE-84593AFCBEA4}" type="datetimeFigureOut">
               <a:rPr lang="en-US" smtClean="0"/>
-              <a:t>7/15/2023</a:t>
+              <a:t>8/11/2023</a:t>
             </a:fld>
             <a:endParaRPr lang="en-US"/>
           </a:p>
@@ -1854,7 +1854,7 @@
           <a:p>
             <a:fld id="{E8FEF256-CCEB-45F6-89AE-84593AFCBEA4}" type="datetimeFigureOut">
               <a:rPr lang="en-US" smtClean="0"/>
-              <a:t>7/15/2023</a:t>
+              <a:t>8/11/2023</a:t>
             </a:fld>
             <a:endParaRPr lang="en-US"/>
           </a:p>
@@ -2131,7 +2131,7 @@
           <a:p>
             <a:fld id="{E8FEF256-CCEB-45F6-89AE-84593AFCBEA4}" type="datetimeFigureOut">
               <a:rPr lang="en-US" smtClean="0"/>
-              <a:t>7/15/2023</a:t>
+              <a:t>8/11/2023</a:t>
             </a:fld>
             <a:endParaRPr lang="en-US"/>
           </a:p>
@@ -2388,7 +2388,7 @@
           <a:p>
             <a:fld id="{E8FEF256-CCEB-45F6-89AE-84593AFCBEA4}" type="datetimeFigureOut">
               <a:rPr lang="en-US" smtClean="0"/>
-              <a:t>7/15/2023</a:t>
+              <a:t>8/11/2023</a:t>
             </a:fld>
             <a:endParaRPr lang="en-US"/>
           </a:p>
@@ -2601,7 +2601,7 @@
           <a:p>
             <a:fld id="{E8FEF256-CCEB-45F6-89AE-84593AFCBEA4}" type="datetimeFigureOut">
               <a:rPr lang="en-US" smtClean="0"/>
-              <a:t>7/15/2023</a:t>
+              <a:t>8/11/2023</a:t>
             </a:fld>
             <a:endParaRPr lang="en-US"/>
           </a:p>
@@ -3793,7 +3793,7 @@
             </a:r>
             <a:r>
               <a:rPr lang="en-US" dirty="0"/>
-              <a:t> is an computer vision model intended for optical character recognition (OCR) on single text-line images.</a:t>
+              <a:t> is a computer vision model intended for optical character recognition (OCR) on single text-line images.</a:t>
             </a:r>
           </a:p>
           <a:p>
@@ -4253,15 +4253,7 @@
           <a:p>
             <a:r>
               <a:rPr lang="en-US" dirty="0"/>
-              <a:t>If you want to know if “AI Art” is really “Art” please attend my workshop </a:t>
-            </a:r>
-            <a:r>
-              <a:rPr lang="en-US" dirty="0" err="1"/>
-              <a:t>nf</a:t>
-            </a:r>
-            <a:r>
-              <a:rPr lang="en-US" dirty="0"/>
-              <a:t> writing medium articles for attention.</a:t>
+              <a:t>If you want to know if “AI Art” is really “Art” please attend my workshop on writing think piece articles for attention.</a:t>
             </a:r>
           </a:p>
           <a:p>
@@ -4383,7 +4375,7 @@
           <a:p>
             <a:r>
               <a:rPr lang="en-US" dirty="0"/>
-              <a:t>Unfortunately trying to set up local image editing would be a whole workshop on it’s own, so we’ll try out an online example at </a:t>
+              <a:t>Unfortunately trying to set up local image editing would be a whole workshop on its own, so we’ll try out an online example at </a:t>
             </a:r>
             <a:r>
               <a:rPr lang="en-US" dirty="0">
@@ -4482,7 +4474,7 @@
             </a:pPr>
             <a:r>
               <a:rPr lang="en-US" dirty="0"/>
-              <a:t>Four Major Sections</a:t>
+              <a:t>Three Major Sections</a:t>
             </a:r>
           </a:p>
           <a:p>
@@ -4513,16 +4505,6 @@
             <a:r>
               <a:rPr lang="en-US" dirty="0"/>
               <a:t>Additional theory and more advanced uses</a:t>
-            </a:r>
-          </a:p>
-          <a:p>
-            <a:pPr marL="514350" indent="-514350">
-              <a:buFont typeface="+mj-lt"/>
-              <a:buAutoNum type="arabicPeriod"/>
-            </a:pPr>
-            <a:r>
-              <a:rPr lang="en-US" dirty="0"/>
-              <a:t>Hacking Capstone using AutoGPT</a:t>
             </a:r>
           </a:p>
         </p:txBody>
@@ -6671,7 +6653,7 @@
           <a:p>
             <a:r>
               <a:rPr lang="en-US" dirty="0"/>
-              <a:t>Solving CTFs and </a:t>
+              <a:t>Solving </a:t>
             </a:r>
             <a:r>
               <a:rPr lang="en-US" dirty="0" err="1"/>
@@ -6718,29 +6700,16 @@
           </a:p>
           <a:p>
             <a:r>
-              <a:rPr lang="en-US" dirty="0"/>
-              <a:t>CTF: </a:t>
+              <a:rPr lang="en-US" dirty="0" err="1"/>
+              <a:t>LeetCode</a:t>
+            </a:r>
+            <a:r>
+              <a:rPr lang="en-US" dirty="0"/>
+              <a:t>: </a:t>
             </a:r>
             <a:r>
               <a:rPr lang="en-US" dirty="0">
                 <a:hlinkClick r:id="rId2"/>
-              </a:rPr>
-              <a:t>https://overthewire.org/wargames/</a:t>
-            </a:r>
-            <a:endParaRPr lang="en-US" dirty="0"/>
-          </a:p>
-          <a:p>
-            <a:r>
-              <a:rPr lang="en-US" dirty="0" err="1"/>
-              <a:t>LeetCode</a:t>
-            </a:r>
-            <a:r>
-              <a:rPr lang="en-US" dirty="0"/>
-              <a:t>: </a:t>
-            </a:r>
-            <a:r>
-              <a:rPr lang="en-US" dirty="0">
-                <a:hlinkClick r:id="rId3"/>
               </a:rPr>
               <a:t>https://leetcode.com/</a:t>
             </a:r>

</xml_diff>